<commit_message>
added methods ppt & notes
</commit_message>
<xml_diff>
--- a/methods.pptx
+++ b/methods.pptx
@@ -5,19 +5,18 @@
     <p:sldMasterId id="2147483648" r:id="rId1"/>
   </p:sldMasterIdLst>
   <p:notesMasterIdLst>
-    <p:notesMasterId r:id="rId12"/>
+    <p:notesMasterId r:id="rId11"/>
   </p:notesMasterIdLst>
   <p:sldIdLst>
     <p:sldId id="256" r:id="rId2"/>
     <p:sldId id="263" r:id="rId3"/>
     <p:sldId id="259" r:id="rId4"/>
-    <p:sldId id="272" r:id="rId5"/>
+    <p:sldId id="278" r:id="rId5"/>
     <p:sldId id="275" r:id="rId6"/>
-    <p:sldId id="267" r:id="rId7"/>
-    <p:sldId id="261" r:id="rId8"/>
-    <p:sldId id="268" r:id="rId9"/>
-    <p:sldId id="269" r:id="rId10"/>
-    <p:sldId id="271" r:id="rId11"/>
+    <p:sldId id="277" r:id="rId7"/>
+    <p:sldId id="267" r:id="rId8"/>
+    <p:sldId id="269" r:id="rId9"/>
+    <p:sldId id="271" r:id="rId10"/>
   </p:sldIdLst>
   <p:sldSz cx="12192000" cy="6858000"/>
   <p:notesSz cx="6858000" cy="9144000"/>
@@ -119,7 +118,7 @@
   <p:extLst>
     <p:ext uri="{EFAFB233-063F-42B5-8137-9DF3F51BA10A}">
       <p15:sldGuideLst xmlns:p15="http://schemas.microsoft.com/office/powerpoint/2012/main">
-        <p15:guide id="1" orient="horz" pos="2160" userDrawn="1">
+        <p15:guide id="1" orient="horz" pos="2136" userDrawn="1">
           <p15:clr>
             <a:srgbClr val="A4A3A4"/>
           </p15:clr>
@@ -217,7 +216,7 @@
           <a:p>
             <a:fld id="{B39B0578-1320-4987-B324-04911F6B1535}" type="datetimeFigureOut">
               <a:rPr lang="en-US" smtClean="0"/>
-              <a:t>11/15/2024</a:t>
+              <a:t>11/18/2024</a:t>
             </a:fld>
             <a:endParaRPr lang="en-US"/>
           </a:p>
@@ -528,6 +527,14 @@
           <a:bodyPr/>
           <a:lstStyle/>
           <a:p>
+            <a:r>
+              <a:rPr lang="en-US" dirty="0"/>
+              <a:t>Prof measured w/ </a:t>
+            </a:r>
+            <a:r>
+              <a:rPr lang="en-US" dirty="0" err="1"/>
+              <a:t>lextale</a:t>
+            </a:r>
             <a:endParaRPr lang="en-US" dirty="0"/>
           </a:p>
         </p:txBody>
@@ -549,7 +556,7 @@
           <a:p>
             <a:fld id="{B2B937C2-C760-42A3-A7B1-55405085465B}" type="slidenum">
               <a:rPr lang="en-US" smtClean="0"/>
-              <a:t>5</a:t>
+              <a:t>3</a:t>
             </a:fld>
             <a:endParaRPr lang="en-US"/>
           </a:p>
@@ -558,7 +565,7 @@
     </p:spTree>
     <p:extLst>
       <p:ext uri="{BB962C8B-B14F-4D97-AF65-F5344CB8AC3E}">
-        <p14:creationId xmlns:p14="http://schemas.microsoft.com/office/powerpoint/2010/main" val="2159068455"/>
+        <p14:creationId xmlns:p14="http://schemas.microsoft.com/office/powerpoint/2010/main" val="1529421133"/>
       </p:ext>
     </p:extLst>
   </p:cSld>
@@ -612,7 +619,34 @@
           <a:bodyPr/>
           <a:lstStyle/>
           <a:p>
-            <a:endParaRPr lang="en-US" dirty="0"/>
+            <a:r>
+              <a:rPr lang="en-US" dirty="0"/>
+              <a:t>320 exp sentences minimum</a:t>
+            </a:r>
+          </a:p>
+          <a:p>
+            <a:r>
+              <a:rPr lang="en-US" dirty="0"/>
+              <a:t>8 practice sentences, randomization is same for all participants.</a:t>
+            </a:r>
+          </a:p>
+          <a:p>
+            <a:r>
+              <a:rPr lang="en-US" dirty="0"/>
+              <a:t>Randomize exp uniquely for each part.</a:t>
+            </a:r>
+          </a:p>
+          <a:p>
+            <a:r>
+              <a:rPr lang="en-US" dirty="0"/>
+              <a:t>2 versions.</a:t>
+            </a:r>
+          </a:p>
+          <a:p>
+            <a:r>
+              <a:rPr lang="en-US" dirty="0"/>
+              <a:t>Latin square in both versions. </a:t>
+            </a:r>
           </a:p>
         </p:txBody>
       </p:sp>
@@ -633,7 +667,7 @@
           <a:p>
             <a:fld id="{B2B937C2-C760-42A3-A7B1-55405085465B}" type="slidenum">
               <a:rPr lang="en-US" smtClean="0"/>
-              <a:t>8</a:t>
+              <a:t>5</a:t>
             </a:fld>
             <a:endParaRPr lang="en-US"/>
           </a:p>
@@ -642,7 +676,94 @@
     </p:spTree>
     <p:extLst>
       <p:ext uri="{BB962C8B-B14F-4D97-AF65-F5344CB8AC3E}">
-        <p14:creationId xmlns:p14="http://schemas.microsoft.com/office/powerpoint/2010/main" val="748616768"/>
+        <p14:creationId xmlns:p14="http://schemas.microsoft.com/office/powerpoint/2010/main" val="2159068455"/>
+      </p:ext>
+    </p:extLst>
+  </p:cSld>
+  <p:clrMapOvr>
+    <a:masterClrMapping/>
+  </p:clrMapOvr>
+</p:notes>
+</file>
+
+<file path=ppt/notesSlides/notesSlide3.xml><?xml version="1.0" encoding="utf-8"?>
+<p:notes xmlns:a="http://schemas.openxmlformats.org/drawingml/2006/main" xmlns:r="http://schemas.openxmlformats.org/officeDocument/2006/relationships" xmlns:p="http://schemas.openxmlformats.org/presentationml/2006/main">
+  <p:cSld>
+    <p:spTree>
+      <p:nvGrpSpPr>
+        <p:cNvPr id="1" name=""/>
+        <p:cNvGrpSpPr/>
+        <p:nvPr/>
+      </p:nvGrpSpPr>
+      <p:grpSpPr>
+        <a:xfrm>
+          <a:off x="0" y="0"/>
+          <a:ext cx="0" cy="0"/>
+          <a:chOff x="0" y="0"/>
+          <a:chExt cx="0" cy="0"/>
+        </a:xfrm>
+      </p:grpSpPr>
+      <p:sp>
+        <p:nvSpPr>
+          <p:cNvPr id="2" name="Slide Image Placeholder 1"/>
+          <p:cNvSpPr>
+            <a:spLocks noGrp="1" noRot="1" noChangeAspect="1"/>
+          </p:cNvSpPr>
+          <p:nvPr>
+            <p:ph type="sldImg"/>
+          </p:nvPr>
+        </p:nvSpPr>
+        <p:spPr/>
+      </p:sp>
+      <p:sp>
+        <p:nvSpPr>
+          <p:cNvPr id="3" name="Notes Placeholder 2"/>
+          <p:cNvSpPr>
+            <a:spLocks noGrp="1"/>
+          </p:cNvSpPr>
+          <p:nvPr>
+            <p:ph type="body" idx="1"/>
+          </p:nvPr>
+        </p:nvSpPr>
+        <p:spPr/>
+        <p:txBody>
+          <a:bodyPr/>
+          <a:lstStyle/>
+          <a:p>
+            <a:r>
+              <a:rPr lang="en-US" dirty="0"/>
+              <a:t>Need to mention limitations – wrap up effects.</a:t>
+            </a:r>
+          </a:p>
+        </p:txBody>
+      </p:sp>
+      <p:sp>
+        <p:nvSpPr>
+          <p:cNvPr id="4" name="Slide Number Placeholder 3"/>
+          <p:cNvSpPr>
+            <a:spLocks noGrp="1"/>
+          </p:cNvSpPr>
+          <p:nvPr>
+            <p:ph type="sldNum" sz="quarter" idx="5"/>
+          </p:nvPr>
+        </p:nvSpPr>
+        <p:spPr/>
+        <p:txBody>
+          <a:bodyPr/>
+          <a:lstStyle/>
+          <a:p>
+            <a:fld id="{B2B937C2-C760-42A3-A7B1-55405085465B}" type="slidenum">
+              <a:rPr lang="en-US" smtClean="0"/>
+              <a:t>7</a:t>
+            </a:fld>
+            <a:endParaRPr lang="en-US"/>
+          </a:p>
+        </p:txBody>
+      </p:sp>
+    </p:spTree>
+    <p:extLst>
+      <p:ext uri="{BB962C8B-B14F-4D97-AF65-F5344CB8AC3E}">
+        <p14:creationId xmlns:p14="http://schemas.microsoft.com/office/powerpoint/2010/main" val="1586714563"/>
       </p:ext>
     </p:extLst>
   </p:cSld>
@@ -799,7 +920,7 @@
           <a:p>
             <a:fld id="{81A512DC-05AA-4CF0-BAFD-A4CD16D78028}" type="datetimeFigureOut">
               <a:rPr lang="en-US" smtClean="0"/>
-              <a:t>11/15/2024</a:t>
+              <a:t>11/18/2024</a:t>
             </a:fld>
             <a:endParaRPr lang="en-US"/>
           </a:p>
@@ -997,7 +1118,7 @@
           <a:p>
             <a:fld id="{81A512DC-05AA-4CF0-BAFD-A4CD16D78028}" type="datetimeFigureOut">
               <a:rPr lang="en-US" smtClean="0"/>
-              <a:t>11/15/2024</a:t>
+              <a:t>11/18/2024</a:t>
             </a:fld>
             <a:endParaRPr lang="en-US"/>
           </a:p>
@@ -1205,7 +1326,7 @@
           <a:p>
             <a:fld id="{81A512DC-05AA-4CF0-BAFD-A4CD16D78028}" type="datetimeFigureOut">
               <a:rPr lang="en-US" smtClean="0"/>
-              <a:t>11/15/2024</a:t>
+              <a:t>11/18/2024</a:t>
             </a:fld>
             <a:endParaRPr lang="en-US"/>
           </a:p>
@@ -1403,7 +1524,7 @@
           <a:p>
             <a:fld id="{81A512DC-05AA-4CF0-BAFD-A4CD16D78028}" type="datetimeFigureOut">
               <a:rPr lang="en-US" smtClean="0"/>
-              <a:t>11/15/2024</a:t>
+              <a:t>11/18/2024</a:t>
             </a:fld>
             <a:endParaRPr lang="en-US"/>
           </a:p>
@@ -1678,7 +1799,7 @@
           <a:p>
             <a:fld id="{81A512DC-05AA-4CF0-BAFD-A4CD16D78028}" type="datetimeFigureOut">
               <a:rPr lang="en-US" smtClean="0"/>
-              <a:t>11/15/2024</a:t>
+              <a:t>11/18/2024</a:t>
             </a:fld>
             <a:endParaRPr lang="en-US"/>
           </a:p>
@@ -1943,7 +2064,7 @@
           <a:p>
             <a:fld id="{81A512DC-05AA-4CF0-BAFD-A4CD16D78028}" type="datetimeFigureOut">
               <a:rPr lang="en-US" smtClean="0"/>
-              <a:t>11/15/2024</a:t>
+              <a:t>11/18/2024</a:t>
             </a:fld>
             <a:endParaRPr lang="en-US"/>
           </a:p>
@@ -2355,7 +2476,7 @@
           <a:p>
             <a:fld id="{81A512DC-05AA-4CF0-BAFD-A4CD16D78028}" type="datetimeFigureOut">
               <a:rPr lang="en-US" smtClean="0"/>
-              <a:t>11/15/2024</a:t>
+              <a:t>11/18/2024</a:t>
             </a:fld>
             <a:endParaRPr lang="en-US"/>
           </a:p>
@@ -2496,7 +2617,7 @@
           <a:p>
             <a:fld id="{81A512DC-05AA-4CF0-BAFD-A4CD16D78028}" type="datetimeFigureOut">
               <a:rPr lang="en-US" smtClean="0"/>
-              <a:t>11/15/2024</a:t>
+              <a:t>11/18/2024</a:t>
             </a:fld>
             <a:endParaRPr lang="en-US"/>
           </a:p>
@@ -2609,7 +2730,7 @@
           <a:p>
             <a:fld id="{81A512DC-05AA-4CF0-BAFD-A4CD16D78028}" type="datetimeFigureOut">
               <a:rPr lang="en-US" smtClean="0"/>
-              <a:t>11/15/2024</a:t>
+              <a:t>11/18/2024</a:t>
             </a:fld>
             <a:endParaRPr lang="en-US"/>
           </a:p>
@@ -2920,7 +3041,7 @@
           <a:p>
             <a:fld id="{81A512DC-05AA-4CF0-BAFD-A4CD16D78028}" type="datetimeFigureOut">
               <a:rPr lang="en-US" smtClean="0"/>
-              <a:t>11/15/2024</a:t>
+              <a:t>11/18/2024</a:t>
             </a:fld>
             <a:endParaRPr lang="en-US"/>
           </a:p>
@@ -3208,7 +3329,7 @@
           <a:p>
             <a:fld id="{81A512DC-05AA-4CF0-BAFD-A4CD16D78028}" type="datetimeFigureOut">
               <a:rPr lang="en-US" smtClean="0"/>
-              <a:t>11/15/2024</a:t>
+              <a:t>11/18/2024</a:t>
             </a:fld>
             <a:endParaRPr lang="en-US"/>
           </a:p>
@@ -3449,7 +3570,7 @@
           <a:p>
             <a:fld id="{81A512DC-05AA-4CF0-BAFD-A4CD16D78028}" type="datetimeFigureOut">
               <a:rPr lang="en-US" smtClean="0"/>
-              <a:t>11/15/2024</a:t>
+              <a:t>11/18/2024</a:t>
             </a:fld>
             <a:endParaRPr lang="en-US"/>
           </a:p>
@@ -3885,13 +4006,13 @@
         <p:spPr/>
         <p:txBody>
           <a:bodyPr>
-            <a:normAutofit fontScale="90000"/>
+            <a:normAutofit/>
           </a:bodyPr>
           <a:lstStyle/>
           <a:p>
             <a:r>
               <a:rPr lang="en-US" dirty="0"/>
-              <a:t>Empathy Conditions ERP Responses in Low-Proficiency Bilinguals</a:t>
+              <a:t>Empathy Conditions ERP Responses in Late Bilinguals</a:t>
             </a:r>
           </a:p>
         </p:txBody>
@@ -3928,79 +4049,6 @@
     <p:extLst>
       <p:ext uri="{BB962C8B-B14F-4D97-AF65-F5344CB8AC3E}">
         <p14:creationId xmlns:p14="http://schemas.microsoft.com/office/powerpoint/2010/main" val="162678431"/>
-      </p:ext>
-    </p:extLst>
-  </p:cSld>
-  <p:clrMapOvr>
-    <a:masterClrMapping/>
-  </p:clrMapOvr>
-</p:sld>
-</file>
-
-<file path=ppt/slides/slide10.xml><?xml version="1.0" encoding="utf-8"?>
-<p:sld xmlns:a="http://schemas.openxmlformats.org/drawingml/2006/main" xmlns:r="http://schemas.openxmlformats.org/officeDocument/2006/relationships" xmlns:p="http://schemas.openxmlformats.org/presentationml/2006/main">
-  <p:cSld>
-    <p:spTree>
-      <p:nvGrpSpPr>
-        <p:cNvPr id="1" name=""/>
-        <p:cNvGrpSpPr/>
-        <p:nvPr/>
-      </p:nvGrpSpPr>
-      <p:grpSpPr>
-        <a:xfrm>
-          <a:off x="0" y="0"/>
-          <a:ext cx="0" cy="0"/>
-          <a:chOff x="0" y="0"/>
-          <a:chExt cx="0" cy="0"/>
-        </a:xfrm>
-      </p:grpSpPr>
-      <p:sp>
-        <p:nvSpPr>
-          <p:cNvPr id="4" name="TextBox 3">
-            <a:extLst>
-              <a:ext uri="{FF2B5EF4-FFF2-40B4-BE49-F238E27FC236}">
-                <a16:creationId xmlns:a16="http://schemas.microsoft.com/office/drawing/2014/main" id="{C509CE96-23A6-770A-A3A4-7E83CD8D3FFA}"/>
-              </a:ext>
-            </a:extLst>
-          </p:cNvPr>
-          <p:cNvSpPr txBox="1"/>
-          <p:nvPr/>
-        </p:nvSpPr>
-        <p:spPr>
-          <a:xfrm>
-            <a:off x="3028910" y="3136612"/>
-            <a:ext cx="6134180" cy="584775"/>
-          </a:xfrm>
-          <a:prstGeom prst="rect">
-            <a:avLst/>
-          </a:prstGeom>
-          <a:noFill/>
-        </p:spPr>
-        <p:txBody>
-          <a:bodyPr wrap="none" rtlCol="0">
-            <a:spAutoFit/>
-          </a:bodyPr>
-          <a:lstStyle/>
-          <a:p>
-            <a:r>
-              <a:rPr lang="en-US" sz="3200" dirty="0"/>
-              <a:t>¿La </a:t>
-            </a:r>
-            <a:r>
-              <a:rPr lang="en-US" sz="3200" dirty="0" err="1"/>
-              <a:t>frase</a:t>
-            </a:r>
-            <a:r>
-              <a:rPr lang="en-US" sz="3200" dirty="0"/>
-              <a:t> coincide con la imagen?</a:t>
-            </a:r>
-          </a:p>
-        </p:txBody>
-      </p:sp>
-    </p:spTree>
-    <p:extLst>
-      <p:ext uri="{BB962C8B-B14F-4D97-AF65-F5344CB8AC3E}">
-        <p14:creationId xmlns:p14="http://schemas.microsoft.com/office/powerpoint/2010/main" val="3766851077"/>
       </p:ext>
     </p:extLst>
   </p:cSld>
@@ -4136,7 +4184,19 @@
           <a:p>
             <a:r>
               <a:rPr lang="en-US" dirty="0"/>
-              <a:t>25 low-proficiency L1 English L2 Spanish late bilinguals</a:t>
+              <a:t>20 low, intermediate, and high proficiency L1 English L2 Spanish late bilinguals</a:t>
+            </a:r>
+          </a:p>
+          <a:p>
+            <a:r>
+              <a:rPr lang="en-US" dirty="0"/>
+              <a:t>Empathy quotient test</a:t>
+            </a:r>
+          </a:p>
+          <a:p>
+            <a:r>
+              <a:rPr lang="en-US" dirty="0"/>
+              <a:t>Working memory test</a:t>
             </a:r>
           </a:p>
         </p:txBody>
@@ -4176,7 +4236,7 @@
           <p:cNvPr id="2" name="Title 1">
             <a:extLst>
               <a:ext uri="{FF2B5EF4-FFF2-40B4-BE49-F238E27FC236}">
-                <a16:creationId xmlns:a16="http://schemas.microsoft.com/office/drawing/2014/main" id="{99A7B549-F705-49CF-9380-172D490A5CB1}"/>
+                <a16:creationId xmlns:a16="http://schemas.microsoft.com/office/drawing/2014/main" id="{B2181C9F-7D72-1BEB-956E-33A946AE13E3}"/>
               </a:ext>
             </a:extLst>
           </p:cNvPr>
@@ -4194,129 +4254,44 @@
           <a:p>
             <a:r>
               <a:rPr lang="en-US" dirty="0"/>
-              <a:t>Match/Mismatch Task</a:t>
-            </a:r>
-          </a:p>
-        </p:txBody>
-      </p:sp>
-      <p:sp>
-        <p:nvSpPr>
-          <p:cNvPr id="3" name="Content Placeholder 2">
-            <a:extLst>
-              <a:ext uri="{FF2B5EF4-FFF2-40B4-BE49-F238E27FC236}">
-                <a16:creationId xmlns:a16="http://schemas.microsoft.com/office/drawing/2014/main" id="{F2003930-9FEC-CCBF-5823-BDF6E19729D2}"/>
-              </a:ext>
-            </a:extLst>
-          </p:cNvPr>
-          <p:cNvSpPr>
-            <a:spLocks noGrp="1"/>
-          </p:cNvSpPr>
+              <a:t>Empathy Quotient</a:t>
+            </a:r>
+          </a:p>
+        </p:txBody>
+      </p:sp>
+      <p:pic>
+        <p:nvPicPr>
+          <p:cNvPr id="5" name="Content Placeholder 4">
+            <a:extLst>
+              <a:ext uri="{FF2B5EF4-FFF2-40B4-BE49-F238E27FC236}">
+                <a16:creationId xmlns:a16="http://schemas.microsoft.com/office/drawing/2014/main" id="{7710901C-8143-E64D-FDFC-9C7D175A50C3}"/>
+              </a:ext>
+            </a:extLst>
+          </p:cNvPr>
+          <p:cNvPicPr>
+            <a:picLocks noGrp="1" noChangeAspect="1"/>
+          </p:cNvPicPr>
           <p:nvPr>
             <p:ph idx="1"/>
           </p:nvPr>
-        </p:nvSpPr>
-        <p:spPr/>
-        <p:txBody>
-          <a:bodyPr/>
-          <a:lstStyle/>
-          <a:p>
-            <a:r>
-              <a:rPr lang="en-US" dirty="0"/>
-              <a:t>Participants were given an expectation that they would listen to a question or statement, and they explicitly decided if the audio matched the given image</a:t>
-            </a:r>
-          </a:p>
-          <a:p>
-            <a:r>
-              <a:rPr lang="en-US" dirty="0"/>
-              <a:t>Sentence types:</a:t>
-            </a:r>
-          </a:p>
-          <a:p>
-            <a:pPr lvl="1"/>
-            <a:r>
-              <a:rPr lang="en-US" dirty="0"/>
-              <a:t>Broad focus: “Ana </a:t>
-            </a:r>
-            <a:r>
-              <a:rPr lang="en-US" dirty="0" err="1"/>
-              <a:t>lleva</a:t>
-            </a:r>
-            <a:r>
-              <a:rPr lang="en-US" dirty="0"/>
-              <a:t> </a:t>
-            </a:r>
-            <a:r>
-              <a:rPr lang="en-US" dirty="0" err="1"/>
-              <a:t>el</a:t>
-            </a:r>
-            <a:r>
-              <a:rPr lang="en-US" dirty="0"/>
-              <a:t> </a:t>
-            </a:r>
-            <a:r>
-              <a:rPr lang="en-US" dirty="0" err="1"/>
-              <a:t>abrigo</a:t>
-            </a:r>
-            <a:r>
-              <a:rPr lang="en-US" dirty="0"/>
-              <a:t>.”</a:t>
-            </a:r>
-          </a:p>
-          <a:p>
-            <a:pPr lvl="1"/>
-            <a:r>
-              <a:rPr lang="en-US" dirty="0"/>
-              <a:t>Narrow focus: (A: “Qu</a:t>
-            </a:r>
-            <a:r>
-              <a:rPr lang="es-ES" dirty="0"/>
-              <a:t>é lleva Ana?”) “Ana lleva el abrigo.”</a:t>
-            </a:r>
-          </a:p>
-          <a:p>
-            <a:pPr lvl="1"/>
-            <a:r>
-              <a:rPr lang="es-ES" dirty="0" err="1"/>
-              <a:t>Partial</a:t>
-            </a:r>
-            <a:r>
-              <a:rPr lang="es-ES" dirty="0"/>
-              <a:t> </a:t>
-            </a:r>
-            <a:r>
-              <a:rPr lang="es-ES" dirty="0" err="1"/>
-              <a:t>wh-question</a:t>
-            </a:r>
-            <a:r>
-              <a:rPr lang="es-ES" dirty="0"/>
-              <a:t>: “¿Por qué ama la navidad?</a:t>
-            </a:r>
-            <a:r>
-              <a:rPr lang="en-US" dirty="0"/>
-              <a:t>”</a:t>
-            </a:r>
-          </a:p>
-          <a:p>
-            <a:pPr lvl="1"/>
-            <a:r>
-              <a:rPr lang="en-US" dirty="0"/>
-              <a:t>Absolute interrogative: “</a:t>
-            </a:r>
-            <a:r>
-              <a:rPr lang="es-ES" dirty="0"/>
-              <a:t>¿Ana lleva el abrigo?</a:t>
-            </a:r>
-            <a:r>
-              <a:rPr lang="en-US" dirty="0"/>
-              <a:t>”</a:t>
-            </a:r>
-          </a:p>
-        </p:txBody>
-      </p:sp>
+        </p:nvPicPr>
+        <p:blipFill>
+          <a:blip r:embed="rId2"/>
+          <a:stretch>
+            <a:fillRect/>
+          </a:stretch>
+        </p:blipFill>
+        <p:spPr>
+          <a:xfrm>
+            <a:off x="0" y="2013779"/>
+            <a:ext cx="12253890" cy="4479096"/>
+          </a:xfrm>
+        </p:spPr>
+      </p:pic>
     </p:spTree>
     <p:extLst>
       <p:ext uri="{BB962C8B-B14F-4D97-AF65-F5344CB8AC3E}">
-        <p14:creationId xmlns:p14="http://schemas.microsoft.com/office/powerpoint/2010/main" val="1134514712"/>
+        <p14:creationId xmlns:p14="http://schemas.microsoft.com/office/powerpoint/2010/main" val="1417832704"/>
       </p:ext>
     </p:extLst>
   </p:cSld>
@@ -4366,7 +4341,7 @@
           <a:p>
             <a:r>
               <a:rPr lang="en-US" dirty="0"/>
-              <a:t>Boundary Tones</a:t>
+              <a:t>Stimuli</a:t>
             </a:r>
           </a:p>
         </p:txBody>
@@ -4386,14 +4361,14 @@
           <p:nvPr>
             <p:extLst>
               <p:ext uri="{D42A27DB-BD31-4B8C-83A1-F6EECF244321}">
-                <p14:modId xmlns:p14="http://schemas.microsoft.com/office/powerpoint/2010/main" val="249766849"/>
+                <p14:modId xmlns:p14="http://schemas.microsoft.com/office/powerpoint/2010/main" val="1769137582"/>
               </p:ext>
             </p:extLst>
           </p:nvPr>
         </p:nvGraphicFramePr>
         <p:xfrm>
-          <a:off x="2171485" y="2603715"/>
-          <a:ext cx="8127999" cy="1849120"/>
+          <a:off x="1043404" y="1473712"/>
+          <a:ext cx="10105192" cy="5151120"/>
         </p:xfrm>
         <a:graphic>
           <a:graphicData uri="http://schemas.openxmlformats.org/drawingml/2006/table">
@@ -4402,36 +4377,43 @@
                 <a:tableStyleId>{5C22544A-7EE6-4342-B048-85BDC9FD1C3A}</a:tableStyleId>
               </a:tblPr>
               <a:tblGrid>
-                <a:gridCol w="2709333">
+                <a:gridCol w="2526298">
                   <a:extLst>
                     <a:ext uri="{9D8B030D-6E8A-4147-A177-3AD203B41FA5}">
                       <a16:colId xmlns:a16="http://schemas.microsoft.com/office/drawing/2014/main" val="1286187069"/>
                     </a:ext>
                   </a:extLst>
                 </a:gridCol>
-                <a:gridCol w="2709333">
+                <a:gridCol w="2526298">
                   <a:extLst>
                     <a:ext uri="{9D8B030D-6E8A-4147-A177-3AD203B41FA5}">
-                      <a16:colId xmlns:a16="http://schemas.microsoft.com/office/drawing/2014/main" val="631671666"/>
+                      <a16:colId xmlns:a16="http://schemas.microsoft.com/office/drawing/2014/main" val="44828741"/>
                     </a:ext>
                   </a:extLst>
                 </a:gridCol>
-                <a:gridCol w="2709333">
+                <a:gridCol w="2526298">
                   <a:extLst>
                     <a:ext uri="{9D8B030D-6E8A-4147-A177-3AD203B41FA5}">
                       <a16:colId xmlns:a16="http://schemas.microsoft.com/office/drawing/2014/main" val="1899404413"/>
                     </a:ext>
                   </a:extLst>
                 </a:gridCol>
+                <a:gridCol w="2526298">
+                  <a:extLst>
+                    <a:ext uri="{9D8B030D-6E8A-4147-A177-3AD203B41FA5}">
+                      <a16:colId xmlns:a16="http://schemas.microsoft.com/office/drawing/2014/main" val="2144751778"/>
+                    </a:ext>
+                  </a:extLst>
+                </a:gridCol>
               </a:tblGrid>
-              <a:tr h="269025">
+              <a:tr h="700589">
                 <a:tc>
                   <a:txBody>
                     <a:bodyPr/>
                     <a:lstStyle/>
                     <a:p>
                       <a:r>
-                        <a:rPr lang="en-US" dirty="0"/>
+                        <a:rPr lang="en-US" sz="2800" dirty="0"/>
                         <a:t>Sentence type</a:t>
                       </a:r>
                     </a:p>
@@ -4444,8 +4426,8 @@
                     <a:lstStyle/>
                     <a:p>
                       <a:r>
-                        <a:rPr lang="en-US" dirty="0"/>
-                        <a:t>English</a:t>
+                        <a:rPr lang="en-US" sz="2800" dirty="0"/>
+                        <a:t>Example</a:t>
                       </a:r>
                     </a:p>
                   </a:txBody>
@@ -4457,8 +4439,21 @@
                     <a:lstStyle/>
                     <a:p>
                       <a:r>
-                        <a:rPr lang="en-US" dirty="0"/>
+                        <a:rPr lang="en-US" sz="2800" dirty="0"/>
                         <a:t>Spanish (stimuli)</a:t>
+                      </a:r>
+                    </a:p>
+                  </a:txBody>
+                  <a:tcPr/>
+                </a:tc>
+                <a:tc>
+                  <a:txBody>
+                    <a:bodyPr/>
+                    <a:lstStyle/>
+                    <a:p>
+                      <a:r>
+                        <a:rPr lang="en-US" sz="2800" dirty="0"/>
+                        <a:t>English</a:t>
                       </a:r>
                     </a:p>
                   </a:txBody>
@@ -4470,14 +4465,14 @@
                   </a:ext>
                 </a:extLst>
               </a:tr>
-              <a:tr h="370840">
+              <a:tr h="820766">
                 <a:tc>
                   <a:txBody>
                     <a:bodyPr/>
                     <a:lstStyle/>
                     <a:p>
                       <a:r>
-                        <a:rPr lang="en-US" dirty="0"/>
+                        <a:rPr lang="en-US" sz="2800" dirty="0"/>
                         <a:t>Broad focus declarative</a:t>
                       </a:r>
                     </a:p>
@@ -4490,8 +4485,32 @@
                     <a:lstStyle/>
                     <a:p>
                       <a:r>
-                        <a:rPr lang="en-US" dirty="0"/>
-                        <a:t>L%</a:t>
+                        <a:rPr lang="en-US" sz="2800" dirty="0"/>
+                        <a:t>Ana </a:t>
+                      </a:r>
+                      <a:r>
+                        <a:rPr lang="en-US" sz="2800" dirty="0" err="1"/>
+                        <a:t>lleva</a:t>
+                      </a:r>
+                      <a:r>
+                        <a:rPr lang="en-US" sz="2800" dirty="0"/>
+                        <a:t> </a:t>
+                      </a:r>
+                      <a:r>
+                        <a:rPr lang="en-US" sz="2800" dirty="0" err="1"/>
+                        <a:t>el</a:t>
+                      </a:r>
+                      <a:r>
+                        <a:rPr lang="en-US" sz="2800" dirty="0"/>
+                        <a:t> </a:t>
+                      </a:r>
+                      <a:r>
+                        <a:rPr lang="en-US" sz="2800" dirty="0" err="1"/>
+                        <a:t>abrigo</a:t>
+                      </a:r>
+                      <a:r>
+                        <a:rPr lang="en-US" sz="2800" dirty="0"/>
+                        <a:t>.</a:t>
                       </a:r>
                     </a:p>
                   </a:txBody>
@@ -4503,8 +4522,21 @@
                     <a:lstStyle/>
                     <a:p>
                       <a:r>
-                        <a:rPr lang="en-US" dirty="0"/>
+                        <a:rPr lang="en-US" sz="2800" dirty="0"/>
                         <a:t>L% or H%</a:t>
+                      </a:r>
+                    </a:p>
+                  </a:txBody>
+                  <a:tcPr/>
+                </a:tc>
+                <a:tc>
+                  <a:txBody>
+                    <a:bodyPr/>
+                    <a:lstStyle/>
+                    <a:p>
+                      <a:r>
+                        <a:rPr lang="en-US" sz="2800" dirty="0"/>
+                        <a:t>L%</a:t>
                       </a:r>
                     </a:p>
                   </a:txBody>
@@ -4516,14 +4548,14 @@
                   </a:ext>
                 </a:extLst>
               </a:tr>
-              <a:tr h="370840">
+              <a:tr h="820766">
                 <a:tc>
                   <a:txBody>
                     <a:bodyPr/>
                     <a:lstStyle/>
                     <a:p>
                       <a:r>
-                        <a:rPr lang="en-US" dirty="0"/>
+                        <a:rPr lang="en-US" sz="2800" dirty="0"/>
                         <a:t>Narrow focus declarative</a:t>
                       </a:r>
                     </a:p>
@@ -4536,8 +4568,32 @@
                     <a:lstStyle/>
                     <a:p>
                       <a:r>
-                        <a:rPr lang="en-US" dirty="0"/>
-                        <a:t>L%</a:t>
+                        <a:rPr lang="en-US" sz="2800" dirty="0"/>
+                        <a:t>(A: Qu</a:t>
+                      </a:r>
+                      <a:r>
+                        <a:rPr lang="es-ES" sz="2800" dirty="0"/>
+                        <a:t>é lleva Ana?</a:t>
+                      </a:r>
+                      <a:r>
+                        <a:rPr lang="en-US" sz="2800" dirty="0"/>
+                        <a:t>) Ana </a:t>
+                      </a:r>
+                      <a:r>
+                        <a:rPr lang="en-US" sz="2800" dirty="0" err="1"/>
+                        <a:t>lleva</a:t>
+                      </a:r>
+                      <a:r>
+                        <a:rPr lang="en-US" sz="2800" dirty="0"/>
+                        <a:t> </a:t>
+                      </a:r>
+                      <a:r>
+                        <a:rPr lang="en-US" sz="2800" dirty="0" err="1"/>
+                        <a:t>el</a:t>
+                      </a:r>
+                      <a:r>
+                        <a:rPr lang="en-US" sz="2800" dirty="0"/>
+                        <a:t> Abrigo.</a:t>
                       </a:r>
                     </a:p>
                   </a:txBody>
@@ -4549,8 +4605,21 @@
                     <a:lstStyle/>
                     <a:p>
                       <a:r>
-                        <a:rPr lang="en-US" dirty="0"/>
+                        <a:rPr lang="en-US" sz="2800" dirty="0"/>
                         <a:t>L% or H%</a:t>
+                      </a:r>
+                    </a:p>
+                  </a:txBody>
+                  <a:tcPr/>
+                </a:tc>
+                <a:tc>
+                  <a:txBody>
+                    <a:bodyPr/>
+                    <a:lstStyle/>
+                    <a:p>
+                      <a:r>
+                        <a:rPr lang="en-US" sz="2800" dirty="0"/>
+                        <a:t>L%</a:t>
                       </a:r>
                     </a:p>
                   </a:txBody>
@@ -4562,22 +4631,22 @@
                   </a:ext>
                 </a:extLst>
               </a:tr>
-              <a:tr h="370840">
+              <a:tr h="820766">
                 <a:tc>
                   <a:txBody>
                     <a:bodyPr/>
                     <a:lstStyle/>
                     <a:p>
                       <a:r>
-                        <a:rPr lang="en-US" dirty="0"/>
+                        <a:rPr lang="en-US" sz="2800" dirty="0"/>
                         <a:t>Partial </a:t>
                       </a:r>
                       <a:r>
-                        <a:rPr lang="en-US" dirty="0" err="1"/>
+                        <a:rPr lang="en-US" sz="2800" dirty="0" err="1"/>
                         <a:t>wh</a:t>
                       </a:r>
                       <a:r>
-                        <a:rPr lang="en-US" dirty="0"/>
+                        <a:rPr lang="en-US" sz="2800" dirty="0"/>
                         <a:t>-question</a:t>
                       </a:r>
                     </a:p>
@@ -4590,8 +4659,22 @@
                     <a:lstStyle/>
                     <a:p>
                       <a:r>
-                        <a:rPr lang="en-US" dirty="0"/>
-                        <a:t>H%</a:t>
+                        <a:rPr lang="es-ES" sz="2800" dirty="0"/>
+                        <a:t>¿Por qué ama la navidad?</a:t>
+                      </a:r>
+                      <a:endParaRPr lang="en-US" sz="2800" dirty="0"/>
+                    </a:p>
+                  </a:txBody>
+                  <a:tcPr/>
+                </a:tc>
+                <a:tc>
+                  <a:txBody>
+                    <a:bodyPr/>
+                    <a:lstStyle/>
+                    <a:p>
+                      <a:r>
+                        <a:rPr lang="en-US" sz="2800" dirty="0"/>
+                        <a:t>L% or H%</a:t>
                       </a:r>
                     </a:p>
                   </a:txBody>
@@ -4603,8 +4686,8 @@
                     <a:lstStyle/>
                     <a:p>
                       <a:r>
-                        <a:rPr lang="en-US" dirty="0"/>
-                        <a:t>L% or H%</a:t>
+                        <a:rPr lang="en-US" sz="2800" dirty="0"/>
+                        <a:t>H%</a:t>
                       </a:r>
                     </a:p>
                   </a:txBody>
@@ -4616,14 +4699,14 @@
                   </a:ext>
                 </a:extLst>
               </a:tr>
-              <a:tr h="370840">
+              <a:tr h="710319">
                 <a:tc>
                   <a:txBody>
                     <a:bodyPr/>
                     <a:lstStyle/>
                     <a:p>
                       <a:r>
-                        <a:rPr lang="en-US" dirty="0"/>
+                        <a:rPr lang="en-US" sz="2800" dirty="0"/>
                         <a:t>Absolute interrogative</a:t>
                       </a:r>
                     </a:p>
@@ -4636,8 +4719,22 @@
                     <a:lstStyle/>
                     <a:p>
                       <a:r>
-                        <a:rPr lang="en-US" dirty="0"/>
-                        <a:t>H%</a:t>
+                        <a:rPr lang="es-ES" sz="2800" dirty="0"/>
+                        <a:t>¿Ana lleva el abrigo?</a:t>
+                      </a:r>
+                      <a:endParaRPr lang="en-US" sz="2800" dirty="0"/>
+                    </a:p>
+                  </a:txBody>
+                  <a:tcPr/>
+                </a:tc>
+                <a:tc>
+                  <a:txBody>
+                    <a:bodyPr/>
+                    <a:lstStyle/>
+                    <a:p>
+                      <a:r>
+                        <a:rPr lang="en-US" sz="2800" dirty="0"/>
+                        <a:t>L% or H%</a:t>
                       </a:r>
                     </a:p>
                   </a:txBody>
@@ -4649,8 +4746,8 @@
                     <a:lstStyle/>
                     <a:p>
                       <a:r>
-                        <a:rPr lang="en-US" dirty="0"/>
-                        <a:t>L% or H%</a:t>
+                        <a:rPr lang="en-US" sz="2800" dirty="0"/>
+                        <a:t>H%</a:t>
                       </a:r>
                     </a:p>
                   </a:txBody>
@@ -4701,7 +4798,7 @@
           <p:cNvPr id="2" name="Title 1">
             <a:extLst>
               <a:ext uri="{FF2B5EF4-FFF2-40B4-BE49-F238E27FC236}">
-                <a16:creationId xmlns:a16="http://schemas.microsoft.com/office/drawing/2014/main" id="{B5CD5B61-FC17-1CE3-9B6A-3B7D05C9B6B7}"/>
+                <a16:creationId xmlns:a16="http://schemas.microsoft.com/office/drawing/2014/main" id="{23134499-41F7-ED42-9D3C-4EE57267EF8E}"/>
               </a:ext>
             </a:extLst>
           </p:cNvPr>
@@ -4729,7 +4826,7 @@
           <p:cNvPr id="3" name="Content Placeholder 2">
             <a:extLst>
               <a:ext uri="{FF2B5EF4-FFF2-40B4-BE49-F238E27FC236}">
-                <a16:creationId xmlns:a16="http://schemas.microsoft.com/office/drawing/2014/main" id="{DD760618-D168-041D-A494-B971FA0DE333}"/>
+                <a16:creationId xmlns:a16="http://schemas.microsoft.com/office/drawing/2014/main" id="{7FF098FD-92E2-A3F4-8F58-2FC819983984}"/>
               </a:ext>
             </a:extLst>
           </p:cNvPr>
@@ -4747,57 +4844,19 @@
           <a:p>
             <a:r>
               <a:rPr lang="en-US" dirty="0"/>
-              <a:t>Fixation cross </a:t>
-            </a:r>
-            <a:r>
-              <a:rPr lang="en-US" dirty="0">
-                <a:sym typeface="Wingdings" panose="05000000000000000000" pitchFamily="2" charset="2"/>
-              </a:rPr>
-              <a:t></a:t>
-            </a:r>
-          </a:p>
-          <a:p>
-            <a:r>
-              <a:rPr lang="en-US" dirty="0">
-                <a:sym typeface="Wingdings" panose="05000000000000000000" pitchFamily="2" charset="2"/>
-              </a:rPr>
-              <a:t>Image of stick figure with speech bubble; inside speech bubble is question mark or period  </a:t>
-            </a:r>
-          </a:p>
-          <a:p>
-            <a:r>
-              <a:rPr lang="en-US" dirty="0">
-                <a:sym typeface="Wingdings" panose="05000000000000000000" pitchFamily="2" charset="2"/>
-              </a:rPr>
-              <a:t>Image disappears </a:t>
-            </a:r>
-          </a:p>
-          <a:p>
-            <a:r>
-              <a:rPr lang="en-US" dirty="0">
-                <a:sym typeface="Wingdings" panose="05000000000000000000" pitchFamily="2" charset="2"/>
-              </a:rPr>
-              <a:t>Fixation cross &amp; audio stimulus </a:t>
-            </a:r>
-          </a:p>
-          <a:p>
-            <a:r>
-              <a:rPr lang="en-US" dirty="0">
-                <a:sym typeface="Wingdings" panose="05000000000000000000" pitchFamily="2" charset="2"/>
-              </a:rPr>
-              <a:t>On screen: “</a:t>
-            </a:r>
-            <a:r>
-              <a:rPr lang="es-ES" dirty="0">
-                <a:sym typeface="Wingdings" panose="05000000000000000000" pitchFamily="2" charset="2"/>
-              </a:rPr>
-              <a:t>¿La frase coincide con la imagen?</a:t>
-            </a:r>
-            <a:r>
-              <a:rPr lang="en-US" dirty="0">
-                <a:sym typeface="Wingdings" panose="05000000000000000000" pitchFamily="2" charset="2"/>
-              </a:rPr>
-              <a:t>”</a:t>
+              <a:t>4 sentence types X 2 boundary tones = 8 conditions</a:t>
+            </a:r>
+          </a:p>
+          <a:p>
+            <a:r>
+              <a:rPr lang="en-US" dirty="0"/>
+              <a:t>8 practice sentences per condition</a:t>
+            </a:r>
+          </a:p>
+          <a:p>
+            <a:r>
+              <a:rPr lang="en-US" dirty="0"/>
+              <a:t>40 items per condition, 320 items total</a:t>
             </a:r>
           </a:p>
         </p:txBody>
@@ -4805,7 +4864,7 @@
     </p:spTree>
     <p:extLst>
       <p:ext uri="{BB962C8B-B14F-4D97-AF65-F5344CB8AC3E}">
-        <p14:creationId xmlns:p14="http://schemas.microsoft.com/office/powerpoint/2010/main" val="208219486"/>
+        <p14:creationId xmlns:p14="http://schemas.microsoft.com/office/powerpoint/2010/main" val="2776413734"/>
       </p:ext>
     </p:extLst>
   </p:cSld>
@@ -4832,40 +4891,124 @@
           <a:chExt cx="0" cy="0"/>
         </a:xfrm>
       </p:grpSpPr>
-      <p:pic>
-        <p:nvPicPr>
-          <p:cNvPr id="5" name="Picture 4">
-            <a:extLst>
-              <a:ext uri="{FF2B5EF4-FFF2-40B4-BE49-F238E27FC236}">
-                <a16:creationId xmlns:a16="http://schemas.microsoft.com/office/drawing/2014/main" id="{424F9A46-F72E-0115-F45A-C5AC45024D9A}"/>
-              </a:ext>
-            </a:extLst>
-          </p:cNvPr>
-          <p:cNvPicPr>
-            <a:picLocks noChangeAspect="1"/>
-          </p:cNvPicPr>
-          <p:nvPr/>
-        </p:nvPicPr>
-        <p:blipFill>
-          <a:blip r:embed="rId2"/>
-          <a:stretch>
-            <a:fillRect/>
-          </a:stretch>
-        </p:blipFill>
-        <p:spPr>
-          <a:xfrm>
-            <a:off x="2340244" y="0"/>
-            <a:ext cx="8152108" cy="6870205"/>
-          </a:xfrm>
-          <a:prstGeom prst="rect">
-            <a:avLst/>
-          </a:prstGeom>
-        </p:spPr>
-      </p:pic>
+      <p:sp>
+        <p:nvSpPr>
+          <p:cNvPr id="2" name="Title 1">
+            <a:extLst>
+              <a:ext uri="{FF2B5EF4-FFF2-40B4-BE49-F238E27FC236}">
+                <a16:creationId xmlns:a16="http://schemas.microsoft.com/office/drawing/2014/main" id="{B5CD5B61-FC17-1CE3-9B6A-3B7D05C9B6B7}"/>
+              </a:ext>
+            </a:extLst>
+          </p:cNvPr>
+          <p:cNvSpPr>
+            <a:spLocks noGrp="1"/>
+          </p:cNvSpPr>
+          <p:nvPr>
+            <p:ph type="title"/>
+          </p:nvPr>
+        </p:nvSpPr>
+        <p:spPr/>
+        <p:txBody>
+          <a:bodyPr/>
+          <a:lstStyle/>
+          <a:p>
+            <a:r>
+              <a:rPr lang="en-US" dirty="0"/>
+              <a:t>Stimuli</a:t>
+            </a:r>
+          </a:p>
+        </p:txBody>
+      </p:sp>
+      <p:sp>
+        <p:nvSpPr>
+          <p:cNvPr id="3" name="Content Placeholder 2">
+            <a:extLst>
+              <a:ext uri="{FF2B5EF4-FFF2-40B4-BE49-F238E27FC236}">
+                <a16:creationId xmlns:a16="http://schemas.microsoft.com/office/drawing/2014/main" id="{DD760618-D168-041D-A494-B971FA0DE333}"/>
+              </a:ext>
+            </a:extLst>
+          </p:cNvPr>
+          <p:cNvSpPr>
+            <a:spLocks noGrp="1"/>
+          </p:cNvSpPr>
+          <p:nvPr>
+            <p:ph idx="1"/>
+          </p:nvPr>
+        </p:nvSpPr>
+        <p:spPr/>
+        <p:txBody>
+          <a:bodyPr/>
+          <a:lstStyle/>
+          <a:p>
+            <a:r>
+              <a:rPr lang="en-US" dirty="0"/>
+              <a:t>Fixation cross </a:t>
+            </a:r>
+            <a:r>
+              <a:rPr lang="en-US" dirty="0">
+                <a:sym typeface="Wingdings" panose="05000000000000000000" pitchFamily="2" charset="2"/>
+              </a:rPr>
+              <a:t></a:t>
+            </a:r>
+          </a:p>
+          <a:p>
+            <a:r>
+              <a:rPr lang="en-US" dirty="0">
+                <a:sym typeface="Wingdings" panose="05000000000000000000" pitchFamily="2" charset="2"/>
+              </a:rPr>
+              <a:t>Audio stimulus </a:t>
+            </a:r>
+          </a:p>
+          <a:p>
+            <a:r>
+              <a:rPr lang="en-US" dirty="0">
+                <a:sym typeface="Wingdings" panose="05000000000000000000" pitchFamily="2" charset="2"/>
+              </a:rPr>
+              <a:t>On screen: “</a:t>
+            </a:r>
+            <a:r>
+              <a:rPr lang="es-ES" dirty="0">
+                <a:sym typeface="Wingdings" panose="05000000000000000000" pitchFamily="2" charset="2"/>
+              </a:rPr>
+              <a:t>¿</a:t>
+            </a:r>
+            <a:r>
+              <a:rPr lang="en-US" dirty="0">
+                <a:sym typeface="Wingdings" panose="05000000000000000000" pitchFamily="2" charset="2"/>
+              </a:rPr>
+              <a:t>Es </a:t>
+            </a:r>
+            <a:r>
+              <a:rPr lang="en-US" dirty="0" err="1">
+                <a:sym typeface="Wingdings" panose="05000000000000000000" pitchFamily="2" charset="2"/>
+              </a:rPr>
+              <a:t>una</a:t>
+            </a:r>
+            <a:r>
+              <a:rPr lang="en-US" dirty="0">
+                <a:sym typeface="Wingdings" panose="05000000000000000000" pitchFamily="2" charset="2"/>
+              </a:rPr>
+              <a:t> </a:t>
+            </a:r>
+            <a:r>
+              <a:rPr lang="en-US" dirty="0" err="1">
+                <a:sym typeface="Wingdings" panose="05000000000000000000" pitchFamily="2" charset="2"/>
+              </a:rPr>
+              <a:t>pregunta</a:t>
+            </a:r>
+            <a:r>
+              <a:rPr lang="en-US" dirty="0">
+                <a:sym typeface="Wingdings" panose="05000000000000000000" pitchFamily="2" charset="2"/>
+              </a:rPr>
+              <a:t>?”</a:t>
+            </a:r>
+          </a:p>
+        </p:txBody>
+      </p:sp>
     </p:spTree>
     <p:extLst>
       <p:ext uri="{BB962C8B-B14F-4D97-AF65-F5344CB8AC3E}">
-        <p14:creationId xmlns:p14="http://schemas.microsoft.com/office/powerpoint/2010/main" val="2292571160"/>
+        <p14:creationId xmlns:p14="http://schemas.microsoft.com/office/powerpoint/2010/main" val="208219486"/>
       </p:ext>
     </p:extLst>
   </p:cSld>
@@ -4894,66 +5037,6 @@
       </p:grpSpPr>
       <p:pic>
         <p:nvPicPr>
-          <p:cNvPr id="7" name="Picture 6">
-            <a:extLst>
-              <a:ext uri="{FF2B5EF4-FFF2-40B4-BE49-F238E27FC236}">
-                <a16:creationId xmlns:a16="http://schemas.microsoft.com/office/drawing/2014/main" id="{7B51CF68-28CA-0151-5912-1C95FBA1EA18}"/>
-              </a:ext>
-            </a:extLst>
-          </p:cNvPr>
-          <p:cNvPicPr>
-            <a:picLocks noChangeAspect="1"/>
-          </p:cNvPicPr>
-          <p:nvPr/>
-        </p:nvPicPr>
-        <p:blipFill>
-          <a:blip r:embed="rId3"/>
-          <a:stretch>
-            <a:fillRect/>
-          </a:stretch>
-        </p:blipFill>
-        <p:spPr>
-          <a:xfrm>
-            <a:off x="4295936" y="1336105"/>
-            <a:ext cx="4166138" cy="4185790"/>
-          </a:xfrm>
-          <a:prstGeom prst="rect">
-            <a:avLst/>
-          </a:prstGeom>
-        </p:spPr>
-      </p:pic>
-    </p:spTree>
-    <p:extLst>
-      <p:ext uri="{BB962C8B-B14F-4D97-AF65-F5344CB8AC3E}">
-        <p14:creationId xmlns:p14="http://schemas.microsoft.com/office/powerpoint/2010/main" val="3694754634"/>
-      </p:ext>
-    </p:extLst>
-  </p:cSld>
-  <p:clrMapOvr>
-    <a:masterClrMapping/>
-  </p:clrMapOvr>
-</p:sld>
-</file>
-
-<file path=ppt/slides/slide9.xml><?xml version="1.0" encoding="utf-8"?>
-<p:sld xmlns:a="http://schemas.openxmlformats.org/drawingml/2006/main" xmlns:r="http://schemas.openxmlformats.org/officeDocument/2006/relationships" xmlns:p="http://schemas.openxmlformats.org/presentationml/2006/main">
-  <p:cSld>
-    <p:spTree>
-      <p:nvGrpSpPr>
-        <p:cNvPr id="1" name=""/>
-        <p:cNvGrpSpPr/>
-        <p:nvPr/>
-      </p:nvGrpSpPr>
-      <p:grpSpPr>
-        <a:xfrm>
-          <a:off x="0" y="0"/>
-          <a:ext cx="0" cy="0"/>
-          <a:chOff x="0" y="0"/>
-          <a:chExt cx="0" cy="0"/>
-        </a:xfrm>
-      </p:grpSpPr>
-      <p:pic>
-        <p:nvPicPr>
           <p:cNvPr id="4" name="Picture 3">
             <a:extLst>
               <a:ext uri="{FF2B5EF4-FFF2-40B4-BE49-F238E27FC236}">
@@ -5012,7 +5095,7 @@
         </p:blipFill>
         <p:spPr>
           <a:xfrm>
-            <a:off x="692258" y="350004"/>
+            <a:off x="475281" y="396499"/>
             <a:ext cx="609600" cy="609600"/>
           </a:xfrm>
           <a:prstGeom prst="rect">
@@ -5114,6 +5197,87 @@
       </p:par>
     </p:tnLst>
   </p:timing>
+</p:sld>
+</file>
+
+<file path=ppt/slides/slide9.xml><?xml version="1.0" encoding="utf-8"?>
+<p:sld xmlns:a="http://schemas.openxmlformats.org/drawingml/2006/main" xmlns:r="http://schemas.openxmlformats.org/officeDocument/2006/relationships" xmlns:p="http://schemas.openxmlformats.org/presentationml/2006/main">
+  <p:cSld>
+    <p:spTree>
+      <p:nvGrpSpPr>
+        <p:cNvPr id="1" name=""/>
+        <p:cNvGrpSpPr/>
+        <p:nvPr/>
+      </p:nvGrpSpPr>
+      <p:grpSpPr>
+        <a:xfrm>
+          <a:off x="0" y="0"/>
+          <a:ext cx="0" cy="0"/>
+          <a:chOff x="0" y="0"/>
+          <a:chExt cx="0" cy="0"/>
+        </a:xfrm>
+      </p:grpSpPr>
+      <p:sp>
+        <p:nvSpPr>
+          <p:cNvPr id="4" name="TextBox 3">
+            <a:extLst>
+              <a:ext uri="{FF2B5EF4-FFF2-40B4-BE49-F238E27FC236}">
+                <a16:creationId xmlns:a16="http://schemas.microsoft.com/office/drawing/2014/main" id="{C509CE96-23A6-770A-A3A4-7E83CD8D3FFA}"/>
+              </a:ext>
+            </a:extLst>
+          </p:cNvPr>
+          <p:cNvSpPr txBox="1"/>
+          <p:nvPr/>
+        </p:nvSpPr>
+        <p:spPr>
+          <a:xfrm>
+            <a:off x="4377933" y="3136612"/>
+            <a:ext cx="3436133" cy="584775"/>
+          </a:xfrm>
+          <a:prstGeom prst="rect">
+            <a:avLst/>
+          </a:prstGeom>
+          <a:noFill/>
+        </p:spPr>
+        <p:txBody>
+          <a:bodyPr wrap="none" rtlCol="0">
+            <a:spAutoFit/>
+          </a:bodyPr>
+          <a:lstStyle/>
+          <a:p>
+            <a:r>
+              <a:rPr lang="en-US" sz="3200" dirty="0"/>
+              <a:t>¿Es </a:t>
+            </a:r>
+            <a:r>
+              <a:rPr lang="en-US" sz="3200" dirty="0" err="1"/>
+              <a:t>una</a:t>
+            </a:r>
+            <a:r>
+              <a:rPr lang="en-US" sz="3200" dirty="0"/>
+              <a:t> </a:t>
+            </a:r>
+            <a:r>
+              <a:rPr lang="en-US" sz="3200" dirty="0" err="1"/>
+              <a:t>pregunta</a:t>
+            </a:r>
+            <a:r>
+              <a:rPr lang="en-US" sz="3200" dirty="0"/>
+              <a:t>?</a:t>
+            </a:r>
+          </a:p>
+        </p:txBody>
+      </p:sp>
+    </p:spTree>
+    <p:extLst>
+      <p:ext uri="{BB962C8B-B14F-4D97-AF65-F5344CB8AC3E}">
+        <p14:creationId xmlns:p14="http://schemas.microsoft.com/office/powerpoint/2010/main" val="3766851077"/>
+      </p:ext>
+    </p:extLst>
+  </p:cSld>
+  <p:clrMapOvr>
+    <a:masterClrMapping/>
+  </p:clrMapOvr>
 </p:sld>
 </file>
 

</xml_diff>